<commit_message>
Final additions before Video!!
</commit_message>
<xml_diff>
--- a/CDawsonCaseStudy2Presentation.pptx
+++ b/CDawsonCaseStudy2Presentation.pptx
@@ -593,7 +593,7 @@
           <a:p>
             <a:fld id="{EA0C0817-A112-4847-8014-A94B7D2A4EA3}" type="datetime1">
               <a:rPr lang="en-US" smtClean="0"/>
-              <a:t>8/14/2020</a:t>
+              <a:t>8/15/2020</a:t>
             </a:fld>
             <a:endParaRPr lang="en-US" dirty="0"/>
           </a:p>
@@ -795,7 +795,7 @@
           <a:p>
             <a:fld id="{7332B432-ACDA-4023-A761-2BAB76577B62}" type="datetime1">
               <a:rPr lang="en-US" smtClean="0"/>
-              <a:t>8/14/2020</a:t>
+              <a:t>8/15/2020</a:t>
             </a:fld>
             <a:endParaRPr lang="en-US" dirty="0"/>
           </a:p>
@@ -1394,7 +1394,7 @@
           <a:p>
             <a:fld id="{D9C646AA-F36E-4540-911D-FFFC0A0EF24A}" type="datetime1">
               <a:rPr lang="en-US" smtClean="0"/>
-              <a:t>8/14/2020</a:t>
+              <a:t>8/15/2020</a:t>
             </a:fld>
             <a:endParaRPr lang="en-US" dirty="0"/>
           </a:p>
@@ -1714,7 +1714,7 @@
           <a:p>
             <a:fld id="{69186D26-FA5F-4637-B602-B7C2DC34CFD4}" type="datetime1">
               <a:rPr lang="en-US" smtClean="0"/>
-              <a:t>8/14/2020</a:t>
+              <a:t>8/15/2020</a:t>
             </a:fld>
             <a:endParaRPr lang="en-US" dirty="0"/>
           </a:p>
@@ -2151,7 +2151,7 @@
           <a:p>
             <a:fld id="{8A7F15D8-96D1-4781-BC50-CA8A088B2FE4}" type="datetime1">
               <a:rPr lang="en-US" smtClean="0"/>
-              <a:t>8/14/2020</a:t>
+              <a:t>8/15/2020</a:t>
             </a:fld>
             <a:endParaRPr lang="en-US" dirty="0"/>
           </a:p>
@@ -2269,7 +2269,7 @@
           <a:p>
             <a:fld id="{F9A96C99-B8F8-4528-BD05-0E16E943DC09}" type="datetime1">
               <a:rPr lang="en-US" smtClean="0"/>
-              <a:t>8/14/2020</a:t>
+              <a:t>8/15/2020</a:t>
             </a:fld>
             <a:endParaRPr lang="en-US" dirty="0"/>
           </a:p>
@@ -2364,7 +2364,7 @@
           <a:p>
             <a:fld id="{03636942-C211-4B28-8DBD-C953E00AF71B}" type="datetime1">
               <a:rPr lang="en-US" smtClean="0"/>
-              <a:t>8/14/2020</a:t>
+              <a:t>8/15/2020</a:t>
             </a:fld>
             <a:endParaRPr lang="en-US" dirty="0"/>
           </a:p>
@@ -2781,7 +2781,7 @@
           <a:p>
             <a:fld id="{7E8D12A6-918A-48BD-8CB9-CA713993B0EA}" type="datetime1">
               <a:rPr lang="en-US" smtClean="0"/>
-              <a:t>8/14/2020</a:t>
+              <a:t>8/15/2020</a:t>
             </a:fld>
             <a:endParaRPr lang="en-US" dirty="0"/>
           </a:p>
@@ -3043,7 +3043,7 @@
             <a:fld id="{E778CE86-875F-4587-BCF6-FA054AFC0D53}" type="datetime1">
               <a:rPr lang="en-US" smtClean="0"/>
               <a:pPr/>
-              <a:t>8/14/2020</a:t>
+              <a:t>8/15/2020</a:t>
             </a:fld>
             <a:endParaRPr lang="en-US" dirty="0"/>
           </a:p>
@@ -3559,7 +3559,7 @@
           <a:p>
             <a:fld id="{F6FA2B21-3FCD-4721-B95C-427943F61125}" type="datetime1">
               <a:rPr lang="en-US" smtClean="0"/>
-              <a:t>8/14/2020</a:t>
+              <a:t>8/15/2020</a:t>
             </a:fld>
             <a:endParaRPr lang="en-US" dirty="0"/>
           </a:p>
@@ -5778,13 +5778,13 @@
         </p:nvSpPr>
         <p:spPr>
           <a:xfrm>
-            <a:off x="372723" y="5682709"/>
-            <a:ext cx="11439414" cy="230057"/>
+            <a:off x="372723" y="5738373"/>
+            <a:ext cx="11439414" cy="174393"/>
           </a:xfrm>
         </p:spPr>
         <p:txBody>
           <a:bodyPr vert="horz" lIns="91440" tIns="45720" rIns="91440" bIns="45720" rtlCol="0" anchor="ctr">
-            <a:normAutofit fontScale="90000"/>
+            <a:noAutofit/>
           </a:bodyPr>
           <a:lstStyle/>
           <a:p>
@@ -5794,7 +5794,7 @@
               </a:lnSpc>
             </a:pPr>
             <a:r>
-              <a:rPr lang="en-US" sz="3100" cap="all" spc="-100" dirty="0">
+              <a:rPr lang="en-US" sz="3600" cap="all" spc="-100" dirty="0">
                 <a:solidFill>
                   <a:schemeClr val="tx1"/>
                 </a:solidFill>
@@ -5802,13 +5802,13 @@
               <a:t>R-Shiny EDA</a:t>
             </a:r>
             <a:br>
-              <a:rPr lang="en-US" sz="3100" cap="all" spc="-100" dirty="0">
+              <a:rPr lang="en-US" sz="3600" cap="all" spc="-100" dirty="0">
                 <a:solidFill>
                   <a:schemeClr val="tx1"/>
                 </a:solidFill>
               </a:rPr>
             </a:br>
-            <a:endParaRPr lang="en-US" sz="3100" cap="all" spc="-100" dirty="0">
+            <a:endParaRPr lang="en-US" sz="3600" cap="all" spc="-100" dirty="0">
               <a:solidFill>
                 <a:schemeClr val="tx1"/>
               </a:solidFill>
@@ -5835,7 +5835,7 @@
         <p:spPr>
           <a:xfrm>
             <a:off x="764275" y="5783001"/>
-            <a:ext cx="10656310" cy="425961"/>
+            <a:ext cx="10656310" cy="746314"/>
           </a:xfrm>
         </p:spPr>
         <p:txBody>
@@ -5857,15 +5857,44 @@
               <a:buNone/>
             </a:pPr>
             <a:r>
-              <a:rPr lang="en-US" sz="1800" spc="80">
+              <a:rPr lang="en-US" sz="1800" spc="80" dirty="0">
                 <a:hlinkClick r:id="rId2"/>
               </a:rPr>
               <a:t>https://dawson-data-science.shinyapps.io/DDSCaseStudy2/</a:t>
             </a:r>
             <a:r>
-              <a:rPr lang="en-US" sz="1800" spc="80"/>
+              <a:rPr lang="en-US" sz="1800" spc="80" dirty="0"/>
               <a:t> </a:t>
             </a:r>
+          </a:p>
+          <a:p>
+            <a:pPr marL="0" indent="0" algn="ctr">
+              <a:lnSpc>
+                <a:spcPct val="100000"/>
+              </a:lnSpc>
+              <a:spcBef>
+                <a:spcPts val="0"/>
+              </a:spcBef>
+              <a:spcAft>
+                <a:spcPts val="600"/>
+              </a:spcAft>
+              <a:buNone/>
+            </a:pPr>
+            <a:r>
+              <a:rPr lang="en-US" sz="1800" spc="80" dirty="0"/>
+              <a:t>GITHUB: </a:t>
+            </a:r>
+            <a:r>
+              <a:rPr lang="en-US" sz="1800" dirty="0">
+                <a:hlinkClick r:id="rId3"/>
+              </a:rPr>
+              <a:t>https://github.com/dawsond-smu/Analytics/tree/master/DDSAnalytics</a:t>
+            </a:r>
+            <a:r>
+              <a:rPr lang="en-US" sz="1800" dirty="0"/>
+              <a:t> </a:t>
+            </a:r>
+            <a:endParaRPr lang="en-US" sz="1800" spc="80" dirty="0"/>
           </a:p>
         </p:txBody>
       </p:sp>
@@ -5948,7 +5977,7 @@
           <p:nvPr/>
         </p:nvPicPr>
         <p:blipFill rotWithShape="1">
-          <a:blip r:embed="rId3"/>
+          <a:blip r:embed="rId4"/>
           <a:srcRect t="-1" b="-447"/>
           <a:stretch/>
         </p:blipFill>
@@ -7538,7 +7567,7 @@
                     <a:p>
                       <a:pPr algn="l" fontAlgn="b"/>
                       <a:r>
-                        <a:rPr lang="en-US" sz="2000" u="none" strike="noStrike">
+                        <a:rPr lang="en-US" sz="2000" u="none" strike="noStrike" dirty="0">
                           <a:effectLst/>
                         </a:rPr>
                         <a:t>       424,008 </a:t>
@@ -11300,21 +11329,21 @@
 </file>
 
 <file path=customXml/item2.xml><?xml version="1.0" encoding="utf-8"?>
+<?mso-contentType ?>
+<FormTemplates xmlns="http://schemas.microsoft.com/sharepoint/v3/contenttype/forms">
+  <Display>DocumentLibraryForm</Display>
+  <Edit>DocumentLibraryForm</Edit>
+  <New>DocumentLibraryForm</New>
+</FormTemplates>
+</file>
+
+<file path=customXml/item3.xml><?xml version="1.0" encoding="utf-8"?>
 <p:properties xmlns:p="http://schemas.microsoft.com/office/2006/metadata/properties" xmlns:xsi="http://www.w3.org/2001/XMLSchema-instance" xmlns:pc="http://schemas.microsoft.com/office/infopath/2007/PartnerControls">
   <documentManagement>
     <Status xmlns="71af3243-3dd4-4a8d-8c0d-dd76da1f02a5">Not started</Status>
     <MediaServiceKeyPoints xmlns="71af3243-3dd4-4a8d-8c0d-dd76da1f02a5" xsi:nil="true"/>
   </documentManagement>
 </p:properties>
-</file>
-
-<file path=customXml/item3.xml><?xml version="1.0" encoding="utf-8"?>
-<?mso-contentType ?>
-<FormTemplates xmlns="http://schemas.microsoft.com/sharepoint/v3/contenttype/forms">
-  <Display>DocumentLibraryForm</Display>
-  <Edit>DocumentLibraryForm</Edit>
-  <New>DocumentLibraryForm</New>
-</FormTemplates>
 </file>
 
 <file path=customXml/itemProps1.xml><?xml version="1.0" encoding="utf-8"?>
@@ -11337,6 +11366,14 @@
 </file>
 
 <file path=customXml/itemProps2.xml><?xml version="1.0" encoding="utf-8"?>
+<ds:datastoreItem xmlns:ds="http://schemas.openxmlformats.org/officeDocument/2006/customXml" ds:itemID="{7745B92C-4D89-4324-B52D-E1F5F627B790}">
+  <ds:schemaRefs>
+    <ds:schemaRef ds:uri="http://schemas.microsoft.com/sharepoint/v3/contenttype/forms"/>
+  </ds:schemaRefs>
+</ds:datastoreItem>
+</file>
+
+<file path=customXml/itemProps3.xml><?xml version="1.0" encoding="utf-8"?>
 <ds:datastoreItem xmlns:ds="http://schemas.openxmlformats.org/officeDocument/2006/customXml" ds:itemID="{E7228C0C-F774-4270-99CB-314B07EBFBE7}">
   <ds:schemaRefs>
     <ds:schemaRef ds:uri="http://schemas.microsoft.com/office/2006/metadata/properties"/>
@@ -11344,12 +11381,4 @@
     <ds:schemaRef ds:uri="71af3243-3dd4-4a8d-8c0d-dd76da1f02a5"/>
   </ds:schemaRefs>
 </ds:datastoreItem>
-</file>
-
-<file path=customXml/itemProps3.xml><?xml version="1.0" encoding="utf-8"?>
-<ds:datastoreItem xmlns:ds="http://schemas.openxmlformats.org/officeDocument/2006/customXml" ds:itemID="{7745B92C-4D89-4324-B52D-E1F5F627B790}">
-  <ds:schemaRefs>
-    <ds:schemaRef ds:uri="http://schemas.microsoft.com/sharepoint/v3/contenttype/forms"/>
-  </ds:schemaRefs>
-</ds:datastoreItem>
 </file>
</xml_diff>